<commit_message>
Added answers provided, need output on ID Slide.
</commit_message>
<xml_diff>
--- a/Presentation/Group 14 Slides.pptx
+++ b/Presentation/Group 14 Slides.pptx
@@ -7767,17 +7767,8 @@
             <a:pPr algn="just"/>
             <a:r>
               <a:rPr lang="en-GB" dirty="0" smtClean="0"/>
-              <a:t>Zhang</a:t>
-            </a:r>
-            <a:r>
-              <a:rPr lang="en-GB" dirty="0" smtClean="0"/>
-              <a:t>, </a:t>
-            </a:r>
-            <a:r>
-              <a:rPr lang="en-GB" dirty="0" smtClean="0"/>
-              <a:t>Yufei</a:t>
-            </a:r>
-            <a:endParaRPr lang="en-GB" dirty="0" smtClean="0"/>
+              <a:t>Zhang, Yufei</a:t>
+            </a:r>
           </a:p>
         </p:txBody>
       </p:sp>
@@ -8218,41 +8209,20 @@
           <a:p>
             <a:r>
               <a:rPr lang="en-GB" dirty="0" smtClean="0"/>
-              <a:t>Iterative Deepening: </a:t>
-            </a:r>
+              <a:t>Iterative Deepening:   Jumail</a:t>
+            </a:r>
+          </a:p>
+          <a:p>
             <a:r>
               <a:rPr lang="en-GB" dirty="0" smtClean="0"/>
-              <a:t>  Jumail</a:t>
-            </a:r>
-            <a:endParaRPr lang="en-GB" dirty="0" smtClean="0"/>
-          </a:p>
-          <a:p>
+              <a:t>Uniform Cost:                Matheus and Abdul-Wahab</a:t>
+            </a:r>
+          </a:p>
+          <a:p>
+            <a:pPr algn="just"/>
             <a:r>
               <a:rPr lang="en-GB" dirty="0" smtClean="0"/>
-              <a:t>Uniform Cost</a:t>
-            </a:r>
-            <a:r>
-              <a:rPr lang="en-GB" dirty="0" smtClean="0"/>
-              <a:t>:                </a:t>
-            </a:r>
-            <a:r>
-              <a:rPr lang="en-GB" dirty="0" smtClean="0"/>
-              <a:t>Matheus and Abdul-Wahab</a:t>
-            </a:r>
-          </a:p>
-          <a:p>
-            <a:pPr algn="just"/>
-            <a:r>
-              <a:rPr lang="en-GB" dirty="0" smtClean="0"/>
-              <a:t>Best-First</a:t>
-            </a:r>
-            <a:r>
-              <a:rPr lang="en-GB" dirty="0" smtClean="0"/>
-              <a:t>:                        </a:t>
-            </a:r>
-            <a:r>
-              <a:rPr lang="en-GB" dirty="0" smtClean="0"/>
-              <a:t>Hasan and Yufei</a:t>
+              <a:t>Best-First:                        Hasan and Yufei</a:t>
             </a:r>
           </a:p>
           <a:p>
@@ -8430,29 +8400,69 @@
           </a:p>
         </p:txBody>
       </p:sp>
-      <p:sp>
-        <p:nvSpPr>
-          <p:cNvPr id="3" name="Content Placeholder 2"/>
-          <p:cNvSpPr>
-            <a:spLocks noGrp="1"/>
-          </p:cNvSpPr>
-          <p:nvPr>
-            <p:ph idx="1"/>
-          </p:nvPr>
-        </p:nvSpPr>
-        <p:spPr/>
-        <p:txBody>
-          <a:bodyPr/>
-          <a:lstStyle/>
-          <a:p>
-            <a:r>
-              <a:rPr lang="en-GB" dirty="0" smtClean="0"/>
-              <a:t>Insert code results</a:t>
-            </a:r>
-            <a:endParaRPr lang="en-GB" dirty="0"/>
-          </a:p>
-        </p:txBody>
-      </p:sp>
+      <p:pic>
+        <p:nvPicPr>
+          <p:cNvPr id="5" name="Picture 4"/>
+          <p:cNvPicPr/>
+          <p:nvPr/>
+        </p:nvPicPr>
+        <p:blipFill>
+          <a:blip r:embed="rId2" cstate="print">
+            <a:extLst>
+              <a:ext uri="{28A0092B-C50C-407E-A947-70E740481C1C}">
+                <a14:useLocalDpi xmlns:a14="http://schemas.microsoft.com/office/drawing/2010/main" val="0"/>
+              </a:ext>
+            </a:extLst>
+          </a:blip>
+          <a:stretch>
+            <a:fillRect/>
+          </a:stretch>
+        </p:blipFill>
+        <p:spPr>
+          <a:xfrm>
+            <a:off x="2592925" y="1904999"/>
+            <a:ext cx="5155412" cy="2306053"/>
+          </a:xfrm>
+          <a:prstGeom prst="rect">
+            <a:avLst/>
+          </a:prstGeom>
+        </p:spPr>
+      </p:pic>
+      <p:pic>
+        <p:nvPicPr>
+          <p:cNvPr id="6" name="Picture 5"/>
+          <p:cNvPicPr/>
+          <p:nvPr/>
+        </p:nvPicPr>
+        <p:blipFill rotWithShape="1">
+          <a:blip r:embed="rId3" cstate="print">
+            <a:extLst>
+              <a:ext uri="{28A0092B-C50C-407E-A947-70E740481C1C}">
+                <a14:useLocalDpi xmlns:a14="http://schemas.microsoft.com/office/drawing/2010/main" val="0"/>
+              </a:ext>
+            </a:extLst>
+          </a:blip>
+          <a:srcRect b="68012"/>
+          <a:stretch/>
+        </p:blipFill>
+        <p:spPr bwMode="auto">
+          <a:xfrm>
+            <a:off x="5776912" y="4430473"/>
+            <a:ext cx="5727700" cy="1561465"/>
+          </a:xfrm>
+          <a:prstGeom prst="rect">
+            <a:avLst/>
+          </a:prstGeom>
+          <a:ln>
+            <a:noFill/>
+          </a:ln>
+          <a:extLst>
+            <a:ext uri="{53640926-AAD7-44D8-BBD7-CCE9431645EC}">
+              <a14:shadowObscured xmlns:a14="http://schemas.microsoft.com/office/drawing/2010/main"/>
+            </a:ext>
+          </a:extLst>
+        </p:spPr>
+      </p:pic>
     </p:spTree>
     <p:extLst>
       <p:ext uri="{BB962C8B-B14F-4D97-AF65-F5344CB8AC3E}">

</xml_diff>